<commit_message>
Updated presentation and fixed api url
</commit_message>
<xml_diff>
--- a/Argumentation framework.pptx
+++ b/Argumentation framework.pptx
@@ -8,17 +8,17 @@
     <p:sldId id="256" r:id="rId2"/>
     <p:sldId id="257" r:id="rId3"/>
     <p:sldId id="258" r:id="rId4"/>
-    <p:sldId id="270" r:id="rId5"/>
-    <p:sldId id="272" r:id="rId6"/>
-    <p:sldId id="279" r:id="rId7"/>
-    <p:sldId id="280" r:id="rId8"/>
-    <p:sldId id="281" r:id="rId9"/>
+    <p:sldId id="272" r:id="rId5"/>
+    <p:sldId id="279" r:id="rId6"/>
+    <p:sldId id="280" r:id="rId7"/>
+    <p:sldId id="298" r:id="rId8"/>
+    <p:sldId id="296" r:id="rId9"/>
     <p:sldId id="282" r:id="rId10"/>
     <p:sldId id="283" r:id="rId11"/>
     <p:sldId id="284" r:id="rId12"/>
     <p:sldId id="285" r:id="rId13"/>
-    <p:sldId id="287" r:id="rId14"/>
-    <p:sldId id="286" r:id="rId15"/>
+    <p:sldId id="297" r:id="rId14"/>
+    <p:sldId id="287" r:id="rId15"/>
     <p:sldId id="290" r:id="rId16"/>
     <p:sldId id="289" r:id="rId17"/>
     <p:sldId id="291" r:id="rId18"/>
@@ -5496,7 +5496,7 @@
           <a:p>
             <a:fld id="{BFD4D1DD-F3DA-4DDC-9B88-FD299EA8A50B}" type="datetimeFigureOut">
               <a:rPr lang="en-US" smtClean="0"/>
-              <a:t>02-Jul-23</a:t>
+              <a:t>03-Jul-23</a:t>
             </a:fld>
             <a:endParaRPr lang="en-US"/>
           </a:p>
@@ -5694,7 +5694,7 @@
           <a:p>
             <a:fld id="{BFD4D1DD-F3DA-4DDC-9B88-FD299EA8A50B}" type="datetimeFigureOut">
               <a:rPr lang="en-US" smtClean="0"/>
-              <a:t>02-Jul-23</a:t>
+              <a:t>03-Jul-23</a:t>
             </a:fld>
             <a:endParaRPr lang="en-US"/>
           </a:p>
@@ -5902,7 +5902,7 @@
           <a:p>
             <a:fld id="{BFD4D1DD-F3DA-4DDC-9B88-FD299EA8A50B}" type="datetimeFigureOut">
               <a:rPr lang="en-US" smtClean="0"/>
-              <a:t>02-Jul-23</a:t>
+              <a:t>03-Jul-23</a:t>
             </a:fld>
             <a:endParaRPr lang="en-US"/>
           </a:p>
@@ -6100,7 +6100,7 @@
           <a:p>
             <a:fld id="{BFD4D1DD-F3DA-4DDC-9B88-FD299EA8A50B}" type="datetimeFigureOut">
               <a:rPr lang="en-US" smtClean="0"/>
-              <a:t>02-Jul-23</a:t>
+              <a:t>03-Jul-23</a:t>
             </a:fld>
             <a:endParaRPr lang="en-US"/>
           </a:p>
@@ -6375,7 +6375,7 @@
           <a:p>
             <a:fld id="{BFD4D1DD-F3DA-4DDC-9B88-FD299EA8A50B}" type="datetimeFigureOut">
               <a:rPr lang="en-US" smtClean="0"/>
-              <a:t>02-Jul-23</a:t>
+              <a:t>03-Jul-23</a:t>
             </a:fld>
             <a:endParaRPr lang="en-US"/>
           </a:p>
@@ -6640,7 +6640,7 @@
           <a:p>
             <a:fld id="{BFD4D1DD-F3DA-4DDC-9B88-FD299EA8A50B}" type="datetimeFigureOut">
               <a:rPr lang="en-US" smtClean="0"/>
-              <a:t>02-Jul-23</a:t>
+              <a:t>03-Jul-23</a:t>
             </a:fld>
             <a:endParaRPr lang="en-US"/>
           </a:p>
@@ -7052,7 +7052,7 @@
           <a:p>
             <a:fld id="{BFD4D1DD-F3DA-4DDC-9B88-FD299EA8A50B}" type="datetimeFigureOut">
               <a:rPr lang="en-US" smtClean="0"/>
-              <a:t>02-Jul-23</a:t>
+              <a:t>03-Jul-23</a:t>
             </a:fld>
             <a:endParaRPr lang="en-US"/>
           </a:p>
@@ -7193,7 +7193,7 @@
           <a:p>
             <a:fld id="{BFD4D1DD-F3DA-4DDC-9B88-FD299EA8A50B}" type="datetimeFigureOut">
               <a:rPr lang="en-US" smtClean="0"/>
-              <a:t>02-Jul-23</a:t>
+              <a:t>03-Jul-23</a:t>
             </a:fld>
             <a:endParaRPr lang="en-US"/>
           </a:p>
@@ -7306,7 +7306,7 @@
           <a:p>
             <a:fld id="{BFD4D1DD-F3DA-4DDC-9B88-FD299EA8A50B}" type="datetimeFigureOut">
               <a:rPr lang="en-US" smtClean="0"/>
-              <a:t>02-Jul-23</a:t>
+              <a:t>03-Jul-23</a:t>
             </a:fld>
             <a:endParaRPr lang="en-US"/>
           </a:p>
@@ -7617,7 +7617,7 @@
           <a:p>
             <a:fld id="{BFD4D1DD-F3DA-4DDC-9B88-FD299EA8A50B}" type="datetimeFigureOut">
               <a:rPr lang="en-US" smtClean="0"/>
-              <a:t>02-Jul-23</a:t>
+              <a:t>03-Jul-23</a:t>
             </a:fld>
             <a:endParaRPr lang="en-US"/>
           </a:p>
@@ -7905,7 +7905,7 @@
           <a:p>
             <a:fld id="{BFD4D1DD-F3DA-4DDC-9B88-FD299EA8A50B}" type="datetimeFigureOut">
               <a:rPr lang="en-US" smtClean="0"/>
-              <a:t>02-Jul-23</a:t>
+              <a:t>03-Jul-23</a:t>
             </a:fld>
             <a:endParaRPr lang="en-US"/>
           </a:p>
@@ -8146,7 +8146,7 @@
           <a:p>
             <a:fld id="{BFD4D1DD-F3DA-4DDC-9B88-FD299EA8A50B}" type="datetimeFigureOut">
               <a:rPr lang="en-US" smtClean="0"/>
-              <a:t>02-Jul-23</a:t>
+              <a:t>03-Jul-23</a:t>
             </a:fld>
             <a:endParaRPr lang="en-US"/>
           </a:p>
@@ -9316,18 +9316,7 @@
                   </a:schemeClr>
                 </a:solidFill>
               </a:rPr>
-              <a:t>Acceptable arguments: </a:t>
-            </a:r>
-            <a:r>
-              <a:rPr lang="pt-BR" sz="3200" dirty="0">
-                <a:solidFill>
-                  <a:schemeClr val="tx1">
-                    <a:lumMod val="65000"/>
-                    <a:lumOff val="35000"/>
-                  </a:schemeClr>
-                </a:solidFill>
-              </a:rPr>
-              <a:t>A, B, C, D, E, F, G | all arguments;</a:t>
+              <a:t>Conflict-free sets: {B, C}, {A, D}, {B, C, E, F};</a:t>
             </a:r>
           </a:p>
           <a:p>
@@ -9340,7 +9329,7 @@
                   </a:schemeClr>
                 </a:solidFill>
               </a:rPr>
-              <a:t>Conflict-free sets: {B, C}, {A, D}, {B, C, E, F};</a:t>
+              <a:t>Stable extensions: {A, E, F};</a:t>
             </a:r>
           </a:p>
           <a:p>
@@ -9361,7 +9350,7 @@
                   </a:schemeClr>
                 </a:solidFill>
               </a:rPr>
-              <a:t>{B, C, E}, {A, E, F}, </a:t>
+              <a:t>{B, C, E, F}, {A, E, F}, </a:t>
             </a:r>
             <a:r>
               <a:rPr lang="en-US" sz="3600" b="1" strike="sngStrike" dirty="0"/>
@@ -9910,30 +9899,6 @@
                   </a:schemeClr>
                 </a:solidFill>
               </a:rPr>
-              <a:t>Acceptable arguments: </a:t>
-            </a:r>
-            <a:r>
-              <a:rPr lang="pt-BR" sz="3200" dirty="0">
-                <a:solidFill>
-                  <a:schemeClr val="tx1">
-                    <a:lumMod val="65000"/>
-                    <a:lumOff val="35000"/>
-                  </a:schemeClr>
-                </a:solidFill>
-              </a:rPr>
-              <a:t>A, B, C, D, E, F, G | all arguments;</a:t>
-            </a:r>
-          </a:p>
-          <a:p>
-            <a:r>
-              <a:rPr lang="en-US" sz="3200" dirty="0">
-                <a:solidFill>
-                  <a:schemeClr val="tx1">
-                    <a:lumMod val="65000"/>
-                    <a:lumOff val="35000"/>
-                  </a:schemeClr>
-                </a:solidFill>
-              </a:rPr>
               <a:t>Conflict-free sets: {B, C}, {A, D}, {B, C, E, F};</a:t>
             </a:r>
           </a:p>
@@ -9947,7 +9912,20 @@
                   </a:schemeClr>
                 </a:solidFill>
               </a:rPr>
-              <a:t>Admissible: {B, C, E}, {A, E, F}, </a:t>
+              <a:t>Stable extensions: {A, E, F};</a:t>
+            </a:r>
+          </a:p>
+          <a:p>
+            <a:r>
+              <a:rPr lang="en-US" sz="3200" dirty="0">
+                <a:solidFill>
+                  <a:schemeClr val="tx1">
+                    <a:lumMod val="65000"/>
+                    <a:lumOff val="35000"/>
+                  </a:schemeClr>
+                </a:solidFill>
+              </a:rPr>
+              <a:t>Admissible: {B, C, E, F}, {A, E, F}, </a:t>
             </a:r>
             <a:r>
               <a:rPr lang="en-US" sz="3200" strike="sngStrike" dirty="0">
@@ -10507,30 +10485,6 @@
                   </a:schemeClr>
                 </a:solidFill>
               </a:rPr>
-              <a:t>Acceptable arguments: </a:t>
-            </a:r>
-            <a:r>
-              <a:rPr lang="pt-BR" sz="3200" dirty="0">
-                <a:solidFill>
-                  <a:schemeClr val="tx1">
-                    <a:lumMod val="65000"/>
-                    <a:lumOff val="35000"/>
-                  </a:schemeClr>
-                </a:solidFill>
-              </a:rPr>
-              <a:t>A, B, C, D, E, F, G | all arguments;</a:t>
-            </a:r>
-          </a:p>
-          <a:p>
-            <a:r>
-              <a:rPr lang="en-US" sz="3200" dirty="0">
-                <a:solidFill>
-                  <a:schemeClr val="tx1">
-                    <a:lumMod val="65000"/>
-                    <a:lumOff val="35000"/>
-                  </a:schemeClr>
-                </a:solidFill>
-              </a:rPr>
               <a:t>Conflict-free sets: {B, C}, {A, D}, {B, C, E, F};</a:t>
             </a:r>
           </a:p>
@@ -10544,7 +10498,20 @@
                   </a:schemeClr>
                 </a:solidFill>
               </a:rPr>
-              <a:t>Admissible: {B, C, E}, {A, E, F}, </a:t>
+              <a:t>Stable extensions: {A, E, F};</a:t>
+            </a:r>
+          </a:p>
+          <a:p>
+            <a:r>
+              <a:rPr lang="en-US" sz="3200" dirty="0">
+                <a:solidFill>
+                  <a:schemeClr val="tx1">
+                    <a:lumMod val="65000"/>
+                    <a:lumOff val="35000"/>
+                  </a:schemeClr>
+                </a:solidFill>
+              </a:rPr>
+              <a:t>Admissible: {B, C, E, F}, {A, E, F}, </a:t>
             </a:r>
             <a:r>
               <a:rPr lang="en-US" sz="3200" strike="sngStrike" dirty="0">
@@ -11122,30 +11089,6 @@
                   </a:schemeClr>
                 </a:solidFill>
               </a:rPr>
-              <a:t>Acceptable arguments: </a:t>
-            </a:r>
-            <a:r>
-              <a:rPr lang="pt-BR" sz="3200" dirty="0">
-                <a:solidFill>
-                  <a:schemeClr val="tx1">
-                    <a:lumMod val="65000"/>
-                    <a:lumOff val="35000"/>
-                  </a:schemeClr>
-                </a:solidFill>
-              </a:rPr>
-              <a:t>A, B, C, D, E, F, G | all arguments;</a:t>
-            </a:r>
-          </a:p>
-          <a:p>
-            <a:r>
-              <a:rPr lang="en-US" sz="3200" dirty="0">
-                <a:solidFill>
-                  <a:schemeClr val="tx1">
-                    <a:lumMod val="65000"/>
-                    <a:lumOff val="35000"/>
-                  </a:schemeClr>
-                </a:solidFill>
-              </a:rPr>
               <a:t>Conflict-free sets: {B, C}, {A, D}, {B, C, E, F};</a:t>
             </a:r>
           </a:p>
@@ -11159,7 +11102,20 @@
                   </a:schemeClr>
                 </a:solidFill>
               </a:rPr>
-              <a:t>Admissible: {B, C, E}, {A, E, F}, </a:t>
+              <a:t>Stable extensions: {A, E, F};</a:t>
+            </a:r>
+          </a:p>
+          <a:p>
+            <a:r>
+              <a:rPr lang="en-US" sz="3200" dirty="0">
+                <a:solidFill>
+                  <a:schemeClr val="tx1">
+                    <a:lumMod val="65000"/>
+                    <a:lumOff val="35000"/>
+                  </a:schemeClr>
+                </a:solidFill>
+              </a:rPr>
+              <a:t>Admissible: {B, C, E, F}, {A, E, F}, </a:t>
             </a:r>
             <a:r>
               <a:rPr lang="en-US" sz="3200" strike="sngStrike" dirty="0">
@@ -11189,17 +11145,17 @@
           <a:p>
             <a:r>
               <a:rPr lang="en-US" sz="3600" b="1" dirty="0"/>
-              <a:t>Preferred: {B, C, E};</a:t>
+              <a:t>Preferred: {B, C, E, F};</a:t>
             </a:r>
           </a:p>
         </p:txBody>
       </p:sp>
       <p:pic>
         <p:nvPicPr>
-          <p:cNvPr id="6" name="Picture 5">
+          <p:cNvPr id="5" name="Picture 4">
             <a:extLst>
               <a:ext uri="{FF2B5EF4-FFF2-40B4-BE49-F238E27FC236}">
-                <a16:creationId xmlns:a16="http://schemas.microsoft.com/office/drawing/2014/main" id="{59E8CACD-F584-0885-0AB4-08C2159590AC}"/>
+                <a16:creationId xmlns:a16="http://schemas.microsoft.com/office/drawing/2014/main" id="{65AE11E6-588D-5703-F06C-AEC5EB3BA39A}"/>
               </a:ext>
             </a:extLst>
           </p:cNvPr>
@@ -11216,8 +11172,8 @@
         </p:blipFill>
         <p:spPr>
           <a:xfrm>
-            <a:off x="326967" y="1984442"/>
-            <a:ext cx="5997971" cy="3149620"/>
+            <a:off x="357551" y="1984442"/>
+            <a:ext cx="5942550" cy="3174787"/>
           </a:xfrm>
           <a:prstGeom prst="rect">
             <a:avLst/>
@@ -11226,10 +11182,10 @@
       </p:pic>
       <p:sp>
         <p:nvSpPr>
-          <p:cNvPr id="5" name="Title 1">
+          <p:cNvPr id="6" name="Title 1">
             <a:extLst>
               <a:ext uri="{FF2B5EF4-FFF2-40B4-BE49-F238E27FC236}">
-                <a16:creationId xmlns:a16="http://schemas.microsoft.com/office/drawing/2014/main" id="{32B40AE3-D326-83A5-3D4A-61D00A5CA828}"/>
+                <a16:creationId xmlns:a16="http://schemas.microsoft.com/office/drawing/2014/main" id="{2C271B7D-16B5-5F91-B13B-C4352CBDEC75}"/>
               </a:ext>
             </a:extLst>
           </p:cNvPr>
@@ -11264,7 +11220,7 @@
     </p:spTree>
     <p:extLst>
       <p:ext uri="{BB962C8B-B14F-4D97-AF65-F5344CB8AC3E}">
-        <p14:creationId xmlns:p14="http://schemas.microsoft.com/office/powerpoint/2010/main" val="2937963986"/>
+        <p14:creationId xmlns:p14="http://schemas.microsoft.com/office/powerpoint/2010/main" val="1659988378"/>
       </p:ext>
     </p:extLst>
   </p:cSld>
@@ -11707,36 +11663,12 @@
         </p:spPr>
         <p:txBody>
           <a:bodyPr>
-            <a:noAutofit/>
+            <a:normAutofit/>
           </a:bodyPr>
           <a:lstStyle/>
           <a:p>
             <a:r>
-              <a:rPr lang="en-US" sz="3300" dirty="0">
-                <a:solidFill>
-                  <a:schemeClr val="tx1">
-                    <a:lumMod val="65000"/>
-                    <a:lumOff val="35000"/>
-                  </a:schemeClr>
-                </a:solidFill>
-              </a:rPr>
-              <a:t>Acceptable arguments: </a:t>
-            </a:r>
-            <a:r>
-              <a:rPr lang="pt-BR" sz="3300" dirty="0">
-                <a:solidFill>
-                  <a:schemeClr val="tx1">
-                    <a:lumMod val="65000"/>
-                    <a:lumOff val="35000"/>
-                  </a:schemeClr>
-                </a:solidFill>
-              </a:rPr>
-              <a:t>A, B, C, D, E, F, G | all arguments;</a:t>
-            </a:r>
-          </a:p>
-          <a:p>
-            <a:r>
-              <a:rPr lang="en-US" sz="3300" dirty="0">
+              <a:rPr lang="en-US" sz="3200" dirty="0">
                 <a:solidFill>
                   <a:schemeClr val="tx1">
                     <a:lumMod val="65000"/>
@@ -11749,7 +11681,7 @@
           </a:p>
           <a:p>
             <a:r>
-              <a:rPr lang="en-US" sz="3300" dirty="0">
+              <a:rPr lang="en-US" sz="3200" dirty="0">
                 <a:solidFill>
                   <a:schemeClr val="tx1">
                     <a:lumMod val="65000"/>
@@ -11757,10 +11689,23 @@
                   </a:schemeClr>
                 </a:solidFill>
               </a:rPr>
-              <a:t>Admissible: {B, C, E}, {A, E, F}, </a:t>
+              <a:t>Stable extensions: {A, E, F};</a:t>
+            </a:r>
+          </a:p>
+          <a:p>
+            <a:r>
+              <a:rPr lang="en-US" sz="3200" dirty="0">
+                <a:solidFill>
+                  <a:schemeClr val="tx1">
+                    <a:lumMod val="65000"/>
+                    <a:lumOff val="35000"/>
+                  </a:schemeClr>
+                </a:solidFill>
+              </a:rPr>
+              <a:t>Admissible: {B, C, E, F}, {A, E, F}, </a:t>
             </a:r>
             <a:r>
-              <a:rPr lang="en-US" sz="3300" strike="sngStrike" dirty="0">
+              <a:rPr lang="en-US" sz="3200" strike="sngStrike" dirty="0">
                 <a:solidFill>
                   <a:schemeClr val="tx1">
                     <a:lumMod val="65000"/>
@@ -11773,7 +11718,7 @@
           </a:p>
           <a:p>
             <a:r>
-              <a:rPr lang="en-US" sz="3300" dirty="0">
+              <a:rPr lang="en-US" sz="3200" dirty="0">
                 <a:solidFill>
                   <a:schemeClr val="tx1">
                     <a:lumMod val="65000"/>
@@ -11786,7 +11731,7 @@
           </a:p>
           <a:p>
             <a:r>
-              <a:rPr lang="en-US" sz="3300" dirty="0">
+              <a:rPr lang="en-US" sz="3200" dirty="0">
                 <a:solidFill>
                   <a:schemeClr val="tx1">
                     <a:lumMod val="65000"/>
@@ -11794,23 +11739,23 @@
                   </a:schemeClr>
                 </a:solidFill>
               </a:rPr>
-              <a:t>Preferred: {B, C, E};</a:t>
+              <a:t>Preferred: {B, C, E, F};</a:t>
             </a:r>
           </a:p>
           <a:p>
             <a:r>
               <a:rPr lang="en-US" sz="3600" b="1" dirty="0"/>
-              <a:t>Grounded: {B, C, E, F};</a:t>
+              <a:t>Grounded: {B, C, E};</a:t>
             </a:r>
           </a:p>
         </p:txBody>
       </p:sp>
       <p:pic>
         <p:nvPicPr>
-          <p:cNvPr id="5" name="Picture 4">
+          <p:cNvPr id="6" name="Picture 5">
             <a:extLst>
               <a:ext uri="{FF2B5EF4-FFF2-40B4-BE49-F238E27FC236}">
-                <a16:creationId xmlns:a16="http://schemas.microsoft.com/office/drawing/2014/main" id="{65AE11E6-588D-5703-F06C-AEC5EB3BA39A}"/>
+                <a16:creationId xmlns:a16="http://schemas.microsoft.com/office/drawing/2014/main" id="{59E8CACD-F584-0885-0AB4-08C2159590AC}"/>
               </a:ext>
             </a:extLst>
           </p:cNvPr>
@@ -11827,8 +11772,8 @@
         </p:blipFill>
         <p:spPr>
           <a:xfrm>
-            <a:off x="357551" y="1959429"/>
-            <a:ext cx="6005360" cy="3208343"/>
+            <a:off x="326967" y="1984442"/>
+            <a:ext cx="5997971" cy="3149620"/>
           </a:xfrm>
           <a:prstGeom prst="rect">
             <a:avLst/>
@@ -11837,10 +11782,10 @@
       </p:pic>
       <p:sp>
         <p:nvSpPr>
-          <p:cNvPr id="6" name="Title 1">
+          <p:cNvPr id="5" name="Title 1">
             <a:extLst>
               <a:ext uri="{FF2B5EF4-FFF2-40B4-BE49-F238E27FC236}">
-                <a16:creationId xmlns:a16="http://schemas.microsoft.com/office/drawing/2014/main" id="{B6918893-814A-AD3D-4370-6DF60915557D}"/>
+                <a16:creationId xmlns:a16="http://schemas.microsoft.com/office/drawing/2014/main" id="{32B40AE3-D326-83A5-3D4A-61D00A5CA828}"/>
               </a:ext>
             </a:extLst>
           </p:cNvPr>
@@ -11875,7 +11820,7 @@
     </p:spTree>
     <p:extLst>
       <p:ext uri="{BB962C8B-B14F-4D97-AF65-F5344CB8AC3E}">
-        <p14:creationId xmlns:p14="http://schemas.microsoft.com/office/powerpoint/2010/main" val="2931409660"/>
+        <p14:creationId xmlns:p14="http://schemas.microsoft.com/office/powerpoint/2010/main" val="2937963986"/>
       </p:ext>
     </p:extLst>
   </p:cSld>
@@ -12678,8 +12623,8 @@
           </a:p>
         </p:txBody>
       </p:sp>
-      <mc:AlternateContent xmlns:mc="http://schemas.openxmlformats.org/markup-compatibility/2006">
-        <mc:Choice xmlns:a14="http://schemas.microsoft.com/office/drawing/2010/main" Requires="a14">
+      <mc:AlternateContent xmlns:mc="http://schemas.openxmlformats.org/markup-compatibility/2006" xmlns:a14="http://schemas.microsoft.com/office/drawing/2010/main">
+        <mc:Choice Requires="a14">
           <p:sp>
             <p:nvSpPr>
               <p:cNvPr id="3" name="Content Placeholder 2">
@@ -13032,7 +12977,7 @@
             </p:txBody>
           </p:sp>
         </mc:Choice>
-        <mc:Fallback>
+        <mc:Fallback xmlns="">
           <p:sp>
             <p:nvSpPr>
               <p:cNvPr id="3" name="Content Placeholder 2">
@@ -13112,8 +13057,8 @@
           </a:p>
         </p:txBody>
       </p:sp>
-      <mc:AlternateContent xmlns:mc="http://schemas.openxmlformats.org/markup-compatibility/2006">
-        <mc:Choice xmlns:a14="http://schemas.microsoft.com/office/drawing/2010/main" Requires="a14">
+      <mc:AlternateContent xmlns:mc="http://schemas.openxmlformats.org/markup-compatibility/2006" xmlns:a14="http://schemas.microsoft.com/office/drawing/2010/main">
+        <mc:Choice Requires="a14">
           <p:graphicFrame>
             <p:nvGraphicFramePr>
               <p:cNvPr id="11" name="Table 12">
@@ -13325,7 +13270,7 @@
             </a:graphic>
           </p:graphicFrame>
         </mc:Choice>
-        <mc:Fallback>
+        <mc:Fallback xmlns="">
           <p:graphicFrame>
             <p:nvGraphicFramePr>
               <p:cNvPr id="11" name="Table 12">
@@ -14356,8 +14301,8 @@
           </a:graphicData>
         </a:graphic>
       </p:graphicFrame>
-      <mc:AlternateContent xmlns:mc="http://schemas.openxmlformats.org/markup-compatibility/2006">
-        <mc:Choice xmlns:p14="http://schemas.microsoft.com/office/powerpoint/2010/main" Requires="p14">
+      <mc:AlternateContent xmlns:mc="http://schemas.openxmlformats.org/markup-compatibility/2006" xmlns:p14="http://schemas.microsoft.com/office/powerpoint/2010/main">
+        <mc:Choice Requires="p14">
           <p:contentPart p14:bwMode="auto" r:id="rId2">
             <p14:nvContentPartPr>
               <p14:cNvPr id="23" name="Ink 22">
@@ -14376,7 +14321,7 @@
             </p14:xfrm>
           </p:contentPart>
         </mc:Choice>
-        <mc:Fallback>
+        <mc:Fallback xmlns="">
           <p:pic>
             <p:nvPicPr>
               <p:cNvPr id="23" name="Ink 22">
@@ -14422,7 +14367,7 @@
           <p:nvPr>
             <p:extLst>
               <p:ext uri="{D42A27DB-BD31-4B8C-83A1-F6EECF244321}">
-                <p14:modId xmlns:p14="http://schemas.microsoft.com/office/powerpoint/2010/main" val="2751494547"/>
+                <p14:modId xmlns:p14="http://schemas.microsoft.com/office/powerpoint/2010/main" val="2377283806"/>
               </p:ext>
             </p:extLst>
           </p:nvPr>
@@ -16595,14 +16540,14 @@
                     <a:p>
                       <a:pPr algn="l" fontAlgn="b"/>
                       <a:r>
-                        <a:rPr lang="en-US" sz="1400" b="0" i="0" u="none" strike="noStrike">
+                        <a:rPr lang="en-US" sz="1400" b="1" i="0" u="none" strike="noStrike" dirty="0">
                           <a:solidFill>
                             <a:srgbClr val="000000"/>
                           </a:solidFill>
                           <a:effectLst/>
                           <a:latin typeface="Calibri" panose="020F0502020204030204" pitchFamily="34" charset="0"/>
                         </a:rPr>
-                        <a:t>Our</a:t>
+                        <a:t>Our algorithm</a:t>
                       </a:r>
                     </a:p>
                   </a:txBody>
@@ -18931,14 +18876,14 @@
                     <a:p>
                       <a:pPr algn="l" fontAlgn="b"/>
                       <a:r>
-                        <a:rPr lang="en-US" sz="1400" b="0" i="0" u="none" strike="noStrike">
+                        <a:rPr lang="en-US" sz="1400" b="1" i="0" u="none" strike="noStrike" dirty="0">
                           <a:solidFill>
                             <a:srgbClr val="000000"/>
                           </a:solidFill>
                           <a:effectLst/>
                           <a:latin typeface="Calibri" panose="020F0502020204030204" pitchFamily="34" charset="0"/>
                         </a:rPr>
-                        <a:t>Our</a:t>
+                        <a:t>Our algorithm</a:t>
                       </a:r>
                     </a:p>
                   </a:txBody>
@@ -21253,14 +21198,14 @@
                     <a:p>
                       <a:pPr algn="l" fontAlgn="b"/>
                       <a:r>
-                        <a:rPr lang="en-US" sz="1400" b="0" i="0" u="none" strike="noStrike">
+                        <a:rPr lang="en-US" sz="1400" b="1" i="0" u="none" strike="noStrike" dirty="0">
                           <a:solidFill>
                             <a:srgbClr val="000000"/>
                           </a:solidFill>
                           <a:effectLst/>
                           <a:latin typeface="Calibri" panose="020F0502020204030204" pitchFamily="34" charset="0"/>
                         </a:rPr>
-                        <a:t>Our</a:t>
+                        <a:t>Our algorithm</a:t>
                       </a:r>
                     </a:p>
                   </a:txBody>
@@ -23577,14 +23522,14 @@
                     <a:p>
                       <a:pPr algn="l" fontAlgn="b"/>
                       <a:r>
-                        <a:rPr lang="en-US" sz="1400" b="0" i="0" u="none" strike="noStrike">
+                        <a:rPr lang="en-US" sz="1400" b="1" i="0" u="none" strike="noStrike" dirty="0">
                           <a:solidFill>
                             <a:srgbClr val="000000"/>
                           </a:solidFill>
                           <a:effectLst/>
                           <a:latin typeface="Calibri" panose="020F0502020204030204" pitchFamily="34" charset="0"/>
                         </a:rPr>
-                        <a:t>Our</a:t>
+                        <a:t>Our algorithm</a:t>
                       </a:r>
                     </a:p>
                   </a:txBody>
@@ -25915,14 +25860,14 @@
                     <a:p>
                       <a:pPr algn="l" fontAlgn="b"/>
                       <a:r>
-                        <a:rPr lang="en-US" sz="1400" b="0" i="0" u="none" strike="noStrike">
+                        <a:rPr lang="en-US" sz="1400" b="1" i="0" u="none" strike="noStrike" dirty="0">
                           <a:solidFill>
                             <a:srgbClr val="000000"/>
                           </a:solidFill>
                           <a:effectLst/>
                           <a:latin typeface="Calibri" panose="020F0502020204030204" pitchFamily="34" charset="0"/>
                         </a:rPr>
-                        <a:t>Our</a:t>
+                        <a:t>Our algorithm</a:t>
                       </a:r>
                     </a:p>
                   </a:txBody>
@@ -27600,6 +27545,94 @@
           </a:graphicData>
         </a:graphic>
       </p:graphicFrame>
+      <p:sp>
+        <p:nvSpPr>
+          <p:cNvPr id="2" name="TextBox 1">
+            <a:extLst>
+              <a:ext uri="{FF2B5EF4-FFF2-40B4-BE49-F238E27FC236}">
+                <a16:creationId xmlns:a16="http://schemas.microsoft.com/office/drawing/2014/main" id="{66194E55-E9F6-020A-B3BE-48D0C244D340}"/>
+              </a:ext>
+            </a:extLst>
+          </p:cNvPr>
+          <p:cNvSpPr txBox="1"/>
+          <p:nvPr/>
+        </p:nvSpPr>
+        <p:spPr>
+          <a:xfrm>
+            <a:off x="-3389" y="847287"/>
+            <a:ext cx="3573479" cy="369332"/>
+          </a:xfrm>
+          <a:prstGeom prst="rect">
+            <a:avLst/>
+          </a:prstGeom>
+          <a:noFill/>
+        </p:spPr>
+        <p:txBody>
+          <a:bodyPr wrap="none" rtlCol="0">
+            <a:spAutoFit/>
+          </a:bodyPr>
+          <a:lstStyle/>
+          <a:p>
+            <a:r>
+              <a:rPr lang="en-US" b="1" dirty="0"/>
+              <a:t>Source: </a:t>
+            </a:r>
+            <a:r>
+              <a:rPr lang="en-US" dirty="0"/>
+              <a:t>https://conarg.dmi.unipg.it</a:t>
+            </a:r>
+          </a:p>
+        </p:txBody>
+      </p:sp>
+      <p:sp>
+        <p:nvSpPr>
+          <p:cNvPr id="3" name="TextBox 2">
+            <a:extLst>
+              <a:ext uri="{FF2B5EF4-FFF2-40B4-BE49-F238E27FC236}">
+                <a16:creationId xmlns:a16="http://schemas.microsoft.com/office/drawing/2014/main" id="{16D88727-D7E0-FCCF-7B92-ADE33AECC31E}"/>
+              </a:ext>
+            </a:extLst>
+          </p:cNvPr>
+          <p:cNvSpPr txBox="1"/>
+          <p:nvPr/>
+        </p:nvSpPr>
+        <p:spPr>
+          <a:xfrm>
+            <a:off x="8545262" y="435139"/>
+            <a:ext cx="3643690" cy="646331"/>
+          </a:xfrm>
+          <a:prstGeom prst="rect">
+            <a:avLst/>
+          </a:prstGeom>
+          <a:noFill/>
+        </p:spPr>
+        <p:txBody>
+          <a:bodyPr wrap="none" rtlCol="0">
+            <a:spAutoFit/>
+          </a:bodyPr>
+          <a:lstStyle/>
+          <a:p>
+            <a:r>
+              <a:rPr lang="en-US" b="1" dirty="0"/>
+              <a:t>ASPARTIX</a:t>
+            </a:r>
+            <a:r>
+              <a:rPr lang="en-US" dirty="0"/>
+              <a:t> – ICCMA 2015, 2019, 2021</a:t>
+            </a:r>
+          </a:p>
+          <a:p>
+            <a:r>
+              <a:rPr lang="en-US" b="1" dirty="0"/>
+              <a:t>ConArg2</a:t>
+            </a:r>
+            <a:r>
+              <a:rPr lang="en-US" dirty="0"/>
+              <a:t> – ICCMA 2015, 2017, 2021</a:t>
+            </a:r>
+          </a:p>
+        </p:txBody>
+      </p:sp>
     </p:spTree>
     <p:extLst>
       <p:ext uri="{BB962C8B-B14F-4D97-AF65-F5344CB8AC3E}">
@@ -27919,8 +27952,8 @@
           </a:p>
         </p:txBody>
       </p:sp>
-      <mc:AlternateContent xmlns:mc="http://schemas.openxmlformats.org/markup-compatibility/2006">
-        <mc:Choice xmlns:p14="http://schemas.microsoft.com/office/powerpoint/2010/main" Requires="p14">
+      <mc:AlternateContent xmlns:mc="http://schemas.openxmlformats.org/markup-compatibility/2006" xmlns:p14="http://schemas.microsoft.com/office/powerpoint/2010/main">
+        <mc:Choice Requires="p14">
           <p:contentPart p14:bwMode="auto" r:id="rId2">
             <p14:nvContentPartPr>
               <p14:cNvPr id="4" name="Ink 3">
@@ -27939,7 +27972,7 @@
             </p14:xfrm>
           </p:contentPart>
         </mc:Choice>
-        <mc:Fallback>
+        <mc:Fallback xmlns="">
           <p:pic>
             <p:nvPicPr>
               <p:cNvPr id="4" name="Ink 3">
@@ -27970,8 +28003,8 @@
           </p:pic>
         </mc:Fallback>
       </mc:AlternateContent>
-      <mc:AlternateContent xmlns:mc="http://schemas.openxmlformats.org/markup-compatibility/2006">
-        <mc:Choice xmlns:a14="http://schemas.microsoft.com/office/drawing/2010/main" Requires="a14">
+      <mc:AlternateContent xmlns:mc="http://schemas.openxmlformats.org/markup-compatibility/2006" xmlns:a14="http://schemas.microsoft.com/office/drawing/2010/main">
+        <mc:Choice Requires="a14">
           <p:graphicFrame>
             <p:nvGraphicFramePr>
               <p:cNvPr id="6" name="Table 6">
@@ -29355,7 +29388,7 @@
             </a:graphic>
           </p:graphicFrame>
         </mc:Choice>
-        <mc:Fallback>
+        <mc:Fallback xmlns="">
           <p:graphicFrame>
             <p:nvGraphicFramePr>
               <p:cNvPr id="6" name="Table 6">
@@ -32502,8 +32535,8 @@
           </a:prstGeom>
         </p:spPr>
       </p:pic>
-      <mc:AlternateContent xmlns:mc="http://schemas.openxmlformats.org/markup-compatibility/2006">
-        <mc:Choice xmlns:a14="http://schemas.microsoft.com/office/drawing/2010/main" Requires="a14">
+      <mc:AlternateContent xmlns:mc="http://schemas.openxmlformats.org/markup-compatibility/2006" xmlns:a14="http://schemas.microsoft.com/office/drawing/2010/main">
+        <mc:Choice Requires="a14">
           <p:sp>
             <p:nvSpPr>
               <p:cNvPr id="14" name="TextBox 13">
@@ -32612,7 +32645,7 @@
             </p:txBody>
           </p:sp>
         </mc:Choice>
-        <mc:Fallback>
+        <mc:Fallback xmlns="">
           <p:sp>
             <p:nvSpPr>
               <p:cNvPr id="14" name="TextBox 13">
@@ -33109,16 +33142,21 @@
           <a:p>
             <a:r>
               <a:rPr lang="en-US" sz="3600" b="1" dirty="0"/>
-              <a:t>Acceptable arguments: </a:t>
+              <a:t>Conflict-free sets: {B, C}</a:t>
             </a:r>
             <a:r>
-              <a:rPr lang="pt-BR" sz="3600" b="1" dirty="0"/>
-              <a:t>A, B, C, D, E, F, G </a:t>
+              <a:rPr lang="en-US" sz="3200" dirty="0">
+                <a:solidFill>
+                  <a:schemeClr val="tx1">
+                    <a:lumMod val="65000"/>
+                    <a:lumOff val="35000"/>
+                  </a:schemeClr>
+                </a:solidFill>
+              </a:rPr>
+              <a:t>,</a:t>
             </a:r>
-            <a:r>
-              <a:rPr lang="pt-BR" sz="3200" dirty="0"/>
-              <a:t>| all arguments;</a:t>
-            </a:r>
+          </a:p>
+          <a:p>
             <a:endParaRPr lang="en-US" sz="3200" dirty="0"/>
           </a:p>
           <a:p>
@@ -33131,7 +33169,7 @@
           <p:cNvPr id="10" name="Picture 9">
             <a:extLst>
               <a:ext uri="{FF2B5EF4-FFF2-40B4-BE49-F238E27FC236}">
-                <a16:creationId xmlns:a16="http://schemas.microsoft.com/office/drawing/2014/main" id="{7C3FDE87-D3C8-61BC-847A-4157F8896E44}"/>
+                <a16:creationId xmlns:a16="http://schemas.microsoft.com/office/drawing/2014/main" id="{13E29DCD-F154-B35A-6880-754B5E39A353}"/>
               </a:ext>
             </a:extLst>
           </p:cNvPr>
@@ -33148,8 +33186,8 @@
         </p:blipFill>
         <p:spPr>
           <a:xfrm>
-            <a:off x="338967" y="1959428"/>
-            <a:ext cx="6079346" cy="3107521"/>
+            <a:off x="345484" y="1959429"/>
+            <a:ext cx="5976568" cy="3192030"/>
           </a:xfrm>
           <a:prstGeom prst="rect">
             <a:avLst/>
@@ -33158,31 +33196,50 @@
       </p:pic>
       <p:sp>
         <p:nvSpPr>
-          <p:cNvPr id="6" name="Title 1">
+          <p:cNvPr id="8" name="Title 1">
             <a:extLst>
               <a:ext uri="{FF2B5EF4-FFF2-40B4-BE49-F238E27FC236}">
-                <a16:creationId xmlns:a16="http://schemas.microsoft.com/office/drawing/2014/main" id="{A49CAB5A-EDAD-230A-1841-37076207C1DE}"/>
+                <a16:creationId xmlns:a16="http://schemas.microsoft.com/office/drawing/2014/main" id="{44FA0C5B-26CA-A28C-6DAE-7AAF589163CA}"/>
               </a:ext>
             </a:extLst>
           </p:cNvPr>
-          <p:cNvSpPr>
-            <a:spLocks noGrp="1"/>
+          <p:cNvSpPr txBox="1">
+            <a:spLocks/>
           </p:cNvSpPr>
-          <p:nvPr>
-            <p:ph type="title"/>
-          </p:nvPr>
+          <p:nvPr/>
         </p:nvSpPr>
         <p:spPr>
           <a:xfrm>
             <a:off x="889233" y="235950"/>
             <a:ext cx="10617555" cy="1590452"/>
           </a:xfrm>
+          <a:prstGeom prst="rect">
+            <a:avLst/>
+          </a:prstGeom>
         </p:spPr>
         <p:txBody>
-          <a:bodyPr>
+          <a:bodyPr vert="horz" lIns="91440" tIns="45720" rIns="91440" bIns="45720" rtlCol="0" anchor="ctr">
             <a:normAutofit/>
           </a:bodyPr>
-          <a:lstStyle/>
+          <a:lstStyle>
+            <a:lvl1pPr algn="l" defTabSz="914400" rtl="0" eaLnBrk="1" latinLnBrk="0" hangingPunct="1">
+              <a:lnSpc>
+                <a:spcPct val="90000"/>
+              </a:lnSpc>
+              <a:spcBef>
+                <a:spcPct val="0"/>
+              </a:spcBef>
+              <a:buNone/>
+              <a:defRPr sz="4400" kern="1200">
+                <a:solidFill>
+                  <a:schemeClr val="tx1"/>
+                </a:solidFill>
+                <a:latin typeface="+mj-lt"/>
+                <a:ea typeface="+mj-ea"/>
+                <a:cs typeface="+mj-cs"/>
+              </a:defRPr>
+            </a:lvl1pPr>
+          </a:lstStyle>
           <a:p>
             <a:pPr algn="ctr"/>
             <a:r>
@@ -33196,7 +33253,7 @@
     </p:spTree>
     <p:extLst>
       <p:ext uri="{BB962C8B-B14F-4D97-AF65-F5344CB8AC3E}">
-        <p14:creationId xmlns:p14="http://schemas.microsoft.com/office/powerpoint/2010/main" val="2752836981"/>
+        <p14:creationId xmlns:p14="http://schemas.microsoft.com/office/powerpoint/2010/main" val="1116156738"/>
       </p:ext>
     </p:extLst>
   </p:cSld>
@@ -33644,6 +33701,14 @@
           <a:lstStyle/>
           <a:p>
             <a:r>
+              <a:rPr lang="en-US" sz="3600" b="1" dirty="0"/>
+              <a:t>Conflict-free sets:</a:t>
+            </a:r>
+            <a:r>
+              <a:rPr lang="en-US" sz="3200" b="1" dirty="0"/>
+              <a:t> </a:t>
+            </a:r>
+            <a:r>
               <a:rPr lang="en-US" sz="3200" dirty="0">
                 <a:solidFill>
                   <a:schemeClr val="tx1">
@@ -33652,24 +33717,15 @@
                   </a:schemeClr>
                 </a:solidFill>
               </a:rPr>
-              <a:t>Acceptable arguments: </a:t>
+              <a:t>{B, C}, </a:t>
             </a:r>
             <a:r>
-              <a:rPr lang="pt-BR" sz="3200" dirty="0">
-                <a:solidFill>
-                  <a:schemeClr val="tx1">
-                    <a:lumMod val="65000"/>
-                    <a:lumOff val="35000"/>
-                  </a:schemeClr>
-                </a:solidFill>
-              </a:rPr>
-              <a:t>A, B, C, D, E, F, G | all arguments;</a:t>
+              <a:rPr lang="en-US" sz="3200" b="1" dirty="0"/>
+              <a:t>{</a:t>
             </a:r>
-          </a:p>
-          <a:p>
             <a:r>
               <a:rPr lang="en-US" sz="3600" b="1" dirty="0"/>
-              <a:t>Conflict-free sets: {B, C}</a:t>
+              <a:t>A, D}</a:t>
             </a:r>
             <a:r>
               <a:rPr lang="en-US" sz="3200" dirty="0">
@@ -33693,10 +33749,10 @@
       </p:sp>
       <p:pic>
         <p:nvPicPr>
-          <p:cNvPr id="10" name="Picture 9">
+          <p:cNvPr id="5" name="Picture 4">
             <a:extLst>
               <a:ext uri="{FF2B5EF4-FFF2-40B4-BE49-F238E27FC236}">
-                <a16:creationId xmlns:a16="http://schemas.microsoft.com/office/drawing/2014/main" id="{13E29DCD-F154-B35A-6880-754B5E39A353}"/>
+                <a16:creationId xmlns:a16="http://schemas.microsoft.com/office/drawing/2014/main" id="{9B125360-FCFC-D4B4-0DE4-54D205519AF5}"/>
               </a:ext>
             </a:extLst>
           </p:cNvPr>
@@ -33713,8 +33769,8 @@
         </p:blipFill>
         <p:spPr>
           <a:xfrm>
-            <a:off x="345484" y="1959429"/>
-            <a:ext cx="5976568" cy="3192030"/>
+            <a:off x="293770" y="1959429"/>
+            <a:ext cx="5962551" cy="3144633"/>
           </a:xfrm>
           <a:prstGeom prst="rect">
             <a:avLst/>
@@ -33723,50 +33779,31 @@
       </p:pic>
       <p:sp>
         <p:nvSpPr>
-          <p:cNvPr id="8" name="Title 1">
+          <p:cNvPr id="10" name="Title 1">
             <a:extLst>
               <a:ext uri="{FF2B5EF4-FFF2-40B4-BE49-F238E27FC236}">
-                <a16:creationId xmlns:a16="http://schemas.microsoft.com/office/drawing/2014/main" id="{44FA0C5B-26CA-A28C-6DAE-7AAF589163CA}"/>
+                <a16:creationId xmlns:a16="http://schemas.microsoft.com/office/drawing/2014/main" id="{89AD120D-2826-9429-EFE8-F1B3A47CA198}"/>
               </a:ext>
             </a:extLst>
           </p:cNvPr>
-          <p:cNvSpPr txBox="1">
-            <a:spLocks/>
+          <p:cNvSpPr>
+            <a:spLocks noGrp="1"/>
           </p:cNvSpPr>
-          <p:nvPr/>
+          <p:nvPr>
+            <p:ph type="title"/>
+          </p:nvPr>
         </p:nvSpPr>
         <p:spPr>
           <a:xfrm>
             <a:off x="889233" y="235950"/>
             <a:ext cx="10617555" cy="1590452"/>
           </a:xfrm>
-          <a:prstGeom prst="rect">
-            <a:avLst/>
-          </a:prstGeom>
         </p:spPr>
         <p:txBody>
-          <a:bodyPr vert="horz" lIns="91440" tIns="45720" rIns="91440" bIns="45720" rtlCol="0" anchor="ctr">
+          <a:bodyPr>
             <a:normAutofit/>
           </a:bodyPr>
-          <a:lstStyle>
-            <a:lvl1pPr algn="l" defTabSz="914400" rtl="0" eaLnBrk="1" latinLnBrk="0" hangingPunct="1">
-              <a:lnSpc>
-                <a:spcPct val="90000"/>
-              </a:lnSpc>
-              <a:spcBef>
-                <a:spcPct val="0"/>
-              </a:spcBef>
-              <a:buNone/>
-              <a:defRPr sz="4400" kern="1200">
-                <a:solidFill>
-                  <a:schemeClr val="tx1"/>
-                </a:solidFill>
-                <a:latin typeface="+mj-lt"/>
-                <a:ea typeface="+mj-ea"/>
-                <a:cs typeface="+mj-cs"/>
-              </a:defRPr>
-            </a:lvl1pPr>
-          </a:lstStyle>
+          <a:lstStyle/>
           <a:p>
             <a:pPr algn="ctr"/>
             <a:r>
@@ -33780,7 +33817,7 @@
     </p:spTree>
     <p:extLst>
       <p:ext uri="{BB962C8B-B14F-4D97-AF65-F5344CB8AC3E}">
-        <p14:creationId xmlns:p14="http://schemas.microsoft.com/office/powerpoint/2010/main" val="1116156738"/>
+        <p14:creationId xmlns:p14="http://schemas.microsoft.com/office/powerpoint/2010/main" val="3348445109"/>
       </p:ext>
     </p:extLst>
   </p:cSld>
@@ -34228,36 +34265,8 @@
           <a:lstStyle/>
           <a:p>
             <a:r>
-              <a:rPr lang="en-US" sz="3200" dirty="0">
-                <a:solidFill>
-                  <a:schemeClr val="tx1">
-                    <a:lumMod val="65000"/>
-                    <a:lumOff val="35000"/>
-                  </a:schemeClr>
-                </a:solidFill>
-              </a:rPr>
-              <a:t>Acceptable arguments: </a:t>
-            </a:r>
-            <a:r>
-              <a:rPr lang="pt-BR" sz="3200" dirty="0">
-                <a:solidFill>
-                  <a:schemeClr val="tx1">
-                    <a:lumMod val="65000"/>
-                    <a:lumOff val="35000"/>
-                  </a:schemeClr>
-                </a:solidFill>
-              </a:rPr>
-              <a:t>A, B, C, D, E, F, G | all arguments;</a:t>
-            </a:r>
-          </a:p>
-          <a:p>
-            <a:r>
               <a:rPr lang="en-US" sz="3600" b="1" dirty="0"/>
-              <a:t>Conflict-free sets:</a:t>
-            </a:r>
-            <a:r>
-              <a:rPr lang="en-US" sz="3200" b="1" dirty="0"/>
-              <a:t> </a:t>
+              <a:t>Conflict-free sets: </a:t>
             </a:r>
             <a:r>
               <a:rPr lang="en-US" sz="3200" dirty="0">
@@ -34268,15 +34277,11 @@
                   </a:schemeClr>
                 </a:solidFill>
               </a:rPr>
-              <a:t>{B, C}, </a:t>
-            </a:r>
-            <a:r>
-              <a:rPr lang="en-US" sz="3200" b="1" dirty="0"/>
-              <a:t>{</a:t>
+              <a:t>{B, C}, {A, D}, </a:t>
             </a:r>
             <a:r>
               <a:rPr lang="en-US" sz="3600" b="1" dirty="0"/>
-              <a:t>A, D}</a:t>
+              <a:t>{B, C, E, F}</a:t>
             </a:r>
             <a:r>
               <a:rPr lang="en-US" sz="3200" dirty="0">
@@ -34287,7 +34292,7 @@
                   </a:schemeClr>
                 </a:solidFill>
               </a:rPr>
-              <a:t>,</a:t>
+              <a:t>;</a:t>
             </a:r>
           </a:p>
           <a:p>
@@ -34300,10 +34305,10 @@
       </p:sp>
       <p:pic>
         <p:nvPicPr>
-          <p:cNvPr id="5" name="Picture 4">
+          <p:cNvPr id="6" name="Picture 5">
             <a:extLst>
               <a:ext uri="{FF2B5EF4-FFF2-40B4-BE49-F238E27FC236}">
-                <a16:creationId xmlns:a16="http://schemas.microsoft.com/office/drawing/2014/main" id="{9B125360-FCFC-D4B4-0DE4-54D205519AF5}"/>
+                <a16:creationId xmlns:a16="http://schemas.microsoft.com/office/drawing/2014/main" id="{944AB39B-ED22-E060-7A9B-7DF7C80B898F}"/>
               </a:ext>
             </a:extLst>
           </p:cNvPr>
@@ -34320,8 +34325,8 @@
         </p:blipFill>
         <p:spPr>
           <a:xfrm>
-            <a:off x="293770" y="1959429"/>
-            <a:ext cx="5962551" cy="3144633"/>
+            <a:off x="277983" y="1959428"/>
+            <a:ext cx="6055973" cy="3157855"/>
           </a:xfrm>
           <a:prstGeom prst="rect">
             <a:avLst/>
@@ -34330,10 +34335,10 @@
       </p:pic>
       <p:sp>
         <p:nvSpPr>
-          <p:cNvPr id="10" name="Title 1">
+          <p:cNvPr id="5" name="Title 1">
             <a:extLst>
               <a:ext uri="{FF2B5EF4-FFF2-40B4-BE49-F238E27FC236}">
-                <a16:creationId xmlns:a16="http://schemas.microsoft.com/office/drawing/2014/main" id="{89AD120D-2826-9429-EFE8-F1B3A47CA198}"/>
+                <a16:creationId xmlns:a16="http://schemas.microsoft.com/office/drawing/2014/main" id="{C07ACB8E-AC65-8082-DD96-EA87DD70A884}"/>
               </a:ext>
             </a:extLst>
           </p:cNvPr>
@@ -34368,7 +34373,7 @@
     </p:spTree>
     <p:extLst>
       <p:ext uri="{BB962C8B-B14F-4D97-AF65-F5344CB8AC3E}">
-        <p14:creationId xmlns:p14="http://schemas.microsoft.com/office/powerpoint/2010/main" val="3348445109"/>
+        <p14:creationId xmlns:p14="http://schemas.microsoft.com/office/powerpoint/2010/main" val="935272698"/>
       </p:ext>
     </p:extLst>
   </p:cSld>
@@ -34824,39 +34829,13 @@
                   </a:schemeClr>
                 </a:solidFill>
               </a:rPr>
-              <a:t>Acceptable arguments: </a:t>
-            </a:r>
-            <a:r>
-              <a:rPr lang="pt-BR" sz="3200" dirty="0">
-                <a:solidFill>
-                  <a:schemeClr val="tx1">
-                    <a:lumMod val="65000"/>
-                    <a:lumOff val="35000"/>
-                  </a:schemeClr>
-                </a:solidFill>
-              </a:rPr>
-              <a:t>A, B, C, D, E, F, G | all arguments;</a:t>
+              <a:t>Conflict-free sets: {B, C}, {A, D}, {B, C, E, F};</a:t>
             </a:r>
           </a:p>
           <a:p>
             <a:r>
               <a:rPr lang="en-US" sz="3600" b="1" dirty="0"/>
-              <a:t>Conflict-free sets: </a:t>
-            </a:r>
-            <a:r>
-              <a:rPr lang="en-US" sz="3200" dirty="0">
-                <a:solidFill>
-                  <a:schemeClr val="tx1">
-                    <a:lumMod val="65000"/>
-                    <a:lumOff val="35000"/>
-                  </a:schemeClr>
-                </a:solidFill>
-              </a:rPr>
-              <a:t>{B, C}, {A, D}, </a:t>
-            </a:r>
-            <a:r>
-              <a:rPr lang="en-US" sz="3600" b="1" dirty="0"/>
-              <a:t>{B, C, E, F}</a:t>
+              <a:t>Stable extensions: {A, E, F}</a:t>
             </a:r>
             <a:r>
               <a:rPr lang="en-US" sz="3200" dirty="0">
@@ -34878,36 +34857,6 @@
           </a:p>
         </p:txBody>
       </p:sp>
-      <p:pic>
-        <p:nvPicPr>
-          <p:cNvPr id="6" name="Picture 5">
-            <a:extLst>
-              <a:ext uri="{FF2B5EF4-FFF2-40B4-BE49-F238E27FC236}">
-                <a16:creationId xmlns:a16="http://schemas.microsoft.com/office/drawing/2014/main" id="{944AB39B-ED22-E060-7A9B-7DF7C80B898F}"/>
-              </a:ext>
-            </a:extLst>
-          </p:cNvPr>
-          <p:cNvPicPr>
-            <a:picLocks noChangeAspect="1"/>
-          </p:cNvPicPr>
-          <p:nvPr/>
-        </p:nvPicPr>
-        <p:blipFill>
-          <a:blip r:embed="rId2"/>
-          <a:stretch>
-            <a:fillRect/>
-          </a:stretch>
-        </p:blipFill>
-        <p:spPr>
-          <a:xfrm>
-            <a:off x="277983" y="1959428"/>
-            <a:ext cx="6055973" cy="3157855"/>
-          </a:xfrm>
-          <a:prstGeom prst="rect">
-            <a:avLst/>
-          </a:prstGeom>
-        </p:spPr>
-      </p:pic>
       <p:sp>
         <p:nvSpPr>
           <p:cNvPr id="5" name="Title 1">
@@ -34945,10 +34894,40 @@
           </a:p>
         </p:txBody>
       </p:sp>
+      <p:pic>
+        <p:nvPicPr>
+          <p:cNvPr id="2" name="Picture 1">
+            <a:extLst>
+              <a:ext uri="{FF2B5EF4-FFF2-40B4-BE49-F238E27FC236}">
+                <a16:creationId xmlns:a16="http://schemas.microsoft.com/office/drawing/2014/main" id="{2A6BE104-1922-820B-C5E4-59846177B9E4}"/>
+              </a:ext>
+            </a:extLst>
+          </p:cNvPr>
+          <p:cNvPicPr>
+            <a:picLocks noChangeAspect="1"/>
+          </p:cNvPicPr>
+          <p:nvPr/>
+        </p:nvPicPr>
+        <p:blipFill>
+          <a:blip r:embed="rId2"/>
+          <a:stretch>
+            <a:fillRect/>
+          </a:stretch>
+        </p:blipFill>
+        <p:spPr>
+          <a:xfrm>
+            <a:off x="339341" y="1984442"/>
+            <a:ext cx="5948849" cy="3116064"/>
+          </a:xfrm>
+          <a:prstGeom prst="rect">
+            <a:avLst/>
+          </a:prstGeom>
+        </p:spPr>
+      </p:pic>
     </p:spTree>
     <p:extLst>
       <p:ext uri="{BB962C8B-B14F-4D97-AF65-F5344CB8AC3E}">
-        <p14:creationId xmlns:p14="http://schemas.microsoft.com/office/powerpoint/2010/main" val="935272698"/>
+        <p14:creationId xmlns:p14="http://schemas.microsoft.com/office/powerpoint/2010/main" val="3195152326"/>
       </p:ext>
     </p:extLst>
   </p:cSld>
@@ -35404,18 +35383,7 @@
                   </a:schemeClr>
                 </a:solidFill>
               </a:rPr>
-              <a:t>Acceptable arguments: </a:t>
-            </a:r>
-            <a:r>
-              <a:rPr lang="pt-BR" sz="3200" dirty="0">
-                <a:solidFill>
-                  <a:schemeClr val="tx1">
-                    <a:lumMod val="65000"/>
-                    <a:lumOff val="35000"/>
-                  </a:schemeClr>
-                </a:solidFill>
-              </a:rPr>
-              <a:t>A, B, C, D, E, F, G | all arguments;</a:t>
+              <a:t>Conflict-free sets: {B, C}, {A, D}, {B, C, E, F};</a:t>
             </a:r>
           </a:p>
           <a:p>
@@ -35428,16 +35396,16 @@
                   </a:schemeClr>
                 </a:solidFill>
               </a:rPr>
-              <a:t>Conflict-free sets: {B, C}, {A, D}, {B, C, E, F};</a:t>
+              <a:t>Stable extensions: {A, E, F};</a:t>
             </a:r>
           </a:p>
           <a:p>
             <a:r>
               <a:rPr lang="en-US" sz="3600" b="1" dirty="0"/>
-              <a:t>Admissible: {B, C, E}</a:t>
+              <a:t>Admissible: {B, C, E, F}</a:t>
             </a:r>
             <a:r>
-              <a:rPr lang="en-US" sz="3200" dirty="0">
+              <a:rPr lang="en-US" sz="2800" dirty="0">
                 <a:solidFill>
                   <a:schemeClr val="tx1">
                     <a:lumMod val="65000"/>
@@ -35447,6 +35415,19 @@
               </a:rPr>
               <a:t>,</a:t>
             </a:r>
+            <a:endParaRPr lang="en-US" sz="2800" dirty="0"/>
+          </a:p>
+          <a:p>
+            <a:endParaRPr lang="en-US" sz="3200" dirty="0">
+              <a:solidFill>
+                <a:schemeClr val="tx1">
+                  <a:lumMod val="65000"/>
+                  <a:lumOff val="35000"/>
+                </a:schemeClr>
+              </a:solidFill>
+            </a:endParaRPr>
+          </a:p>
+          <a:p>
             <a:endParaRPr lang="en-US" sz="3200" dirty="0"/>
           </a:p>
           <a:p>
@@ -35456,10 +35437,10 @@
       </p:sp>
       <p:pic>
         <p:nvPicPr>
-          <p:cNvPr id="5" name="Picture 4">
+          <p:cNvPr id="6" name="Picture 5">
             <a:extLst>
               <a:ext uri="{FF2B5EF4-FFF2-40B4-BE49-F238E27FC236}">
-                <a16:creationId xmlns:a16="http://schemas.microsoft.com/office/drawing/2014/main" id="{8E9FAD83-9FDF-599E-2A72-114BDC930E0C}"/>
+                <a16:creationId xmlns:a16="http://schemas.microsoft.com/office/drawing/2014/main" id="{944AB39B-ED22-E060-7A9B-7DF7C80B898F}"/>
               </a:ext>
             </a:extLst>
           </p:cNvPr>
@@ -35476,8 +35457,8 @@
         </p:blipFill>
         <p:spPr>
           <a:xfrm>
-            <a:off x="318578" y="1984442"/>
-            <a:ext cx="5946266" cy="3149620"/>
+            <a:off x="277983" y="1959428"/>
+            <a:ext cx="6055973" cy="3157855"/>
           </a:xfrm>
           <a:prstGeom prst="rect">
             <a:avLst/>
@@ -35486,10 +35467,10 @@
       </p:pic>
       <p:sp>
         <p:nvSpPr>
-          <p:cNvPr id="6" name="Title 1">
+          <p:cNvPr id="5" name="Title 1">
             <a:extLst>
               <a:ext uri="{FF2B5EF4-FFF2-40B4-BE49-F238E27FC236}">
-                <a16:creationId xmlns:a16="http://schemas.microsoft.com/office/drawing/2014/main" id="{8A80B8ED-C5B5-5C8E-FB86-44E3E8ED0C21}"/>
+                <a16:creationId xmlns:a16="http://schemas.microsoft.com/office/drawing/2014/main" id="{C07ACB8E-AC65-8082-DD96-EA87DD70A884}"/>
               </a:ext>
             </a:extLst>
           </p:cNvPr>
@@ -35524,7 +35505,7 @@
     </p:spTree>
     <p:extLst>
       <p:ext uri="{BB962C8B-B14F-4D97-AF65-F5344CB8AC3E}">
-        <p14:creationId xmlns:p14="http://schemas.microsoft.com/office/powerpoint/2010/main" val="963238614"/>
+        <p14:creationId xmlns:p14="http://schemas.microsoft.com/office/powerpoint/2010/main" val="1583986415"/>
       </p:ext>
     </p:extLst>
   </p:cSld>
@@ -35980,18 +35961,7 @@
                   </a:schemeClr>
                 </a:solidFill>
               </a:rPr>
-              <a:t>Acceptable arguments: </a:t>
-            </a:r>
-            <a:r>
-              <a:rPr lang="pt-BR" sz="3200" dirty="0">
-                <a:solidFill>
-                  <a:schemeClr val="tx1">
-                    <a:lumMod val="65000"/>
-                    <a:lumOff val="35000"/>
-                  </a:schemeClr>
-                </a:solidFill>
-              </a:rPr>
-              <a:t>A, B, C, D, E, F, G | all arguments;</a:t>
+              <a:t>Conflict-free sets: {B, C}, {A, D}, {B, C, E, F};</a:t>
             </a:r>
           </a:p>
           <a:p>
@@ -36004,7 +35974,7 @@
                   </a:schemeClr>
                 </a:solidFill>
               </a:rPr>
-              <a:t>Conflict-free sets: {B, C}, {A, D}, {B, C, E, F};</a:t>
+              <a:t>Stable extensions: {A, E, F};</a:t>
             </a:r>
           </a:p>
           <a:p>
@@ -36025,7 +35995,7 @@
                   </a:schemeClr>
                 </a:solidFill>
               </a:rPr>
-              <a:t>{B, C, E}, </a:t>
+              <a:t>{B, C, E, F}, </a:t>
             </a:r>
             <a:r>
               <a:rPr lang="en-US" sz="3600" b="1" dirty="0"/>

</xml_diff>